<commit_message>
Minor correction to Powerpoint
</commit_message>
<xml_diff>
--- a/Case registry 02262014.pptx
+++ b/Case registry 02262014.pptx
@@ -369,7 +369,7 @@
           <a:p>
             <a:fld id="{E68DDAF5-1EDA-4D1F-ADBC-948243D708D4}" type="datetimeFigureOut">
               <a:rPr lang="en-US" smtClean="0"/>
-              <a:t>3/20/17</a:t>
+              <a:t>4/10/17</a:t>
             </a:fld>
             <a:endParaRPr lang="en-US"/>
           </a:p>
@@ -539,7 +539,7 @@
           <a:p>
             <a:fld id="{E68DDAF5-1EDA-4D1F-ADBC-948243D708D4}" type="datetimeFigureOut">
               <a:rPr lang="en-US" smtClean="0"/>
-              <a:t>3/20/17</a:t>
+              <a:t>4/10/17</a:t>
             </a:fld>
             <a:endParaRPr lang="en-US"/>
           </a:p>
@@ -719,7 +719,7 @@
           <a:p>
             <a:fld id="{E68DDAF5-1EDA-4D1F-ADBC-948243D708D4}" type="datetimeFigureOut">
               <a:rPr lang="en-US" smtClean="0"/>
-              <a:t>3/20/17</a:t>
+              <a:t>4/10/17</a:t>
             </a:fld>
             <a:endParaRPr lang="en-US"/>
           </a:p>
@@ -905,7 +905,7 @@
           <a:p>
             <a:fld id="{E68DDAF5-1EDA-4D1F-ADBC-948243D708D4}" type="datetimeFigureOut">
               <a:rPr lang="en-US" smtClean="0"/>
-              <a:t>3/20/17</a:t>
+              <a:t>4/10/17</a:t>
             </a:fld>
             <a:endParaRPr lang="en-US"/>
           </a:p>
@@ -1151,7 +1151,7 @@
           <a:p>
             <a:fld id="{E68DDAF5-1EDA-4D1F-ADBC-948243D708D4}" type="datetimeFigureOut">
               <a:rPr lang="en-US" smtClean="0"/>
-              <a:t>3/20/17</a:t>
+              <a:t>4/10/17</a:t>
             </a:fld>
             <a:endParaRPr lang="en-US"/>
           </a:p>
@@ -1439,7 +1439,7 @@
           <a:p>
             <a:fld id="{E68DDAF5-1EDA-4D1F-ADBC-948243D708D4}" type="datetimeFigureOut">
               <a:rPr lang="en-US" smtClean="0"/>
-              <a:t>3/20/17</a:t>
+              <a:t>4/10/17</a:t>
             </a:fld>
             <a:endParaRPr lang="en-US"/>
           </a:p>
@@ -1861,7 +1861,7 @@
           <a:p>
             <a:fld id="{E68DDAF5-1EDA-4D1F-ADBC-948243D708D4}" type="datetimeFigureOut">
               <a:rPr lang="en-US" smtClean="0"/>
-              <a:t>3/20/17</a:t>
+              <a:t>4/10/17</a:t>
             </a:fld>
             <a:endParaRPr lang="en-US"/>
           </a:p>
@@ -1979,7 +1979,7 @@
           <a:p>
             <a:fld id="{E68DDAF5-1EDA-4D1F-ADBC-948243D708D4}" type="datetimeFigureOut">
               <a:rPr lang="en-US" smtClean="0"/>
-              <a:t>3/20/17</a:t>
+              <a:t>4/10/17</a:t>
             </a:fld>
             <a:endParaRPr lang="en-US"/>
           </a:p>
@@ -2084,7 +2084,7 @@
           <a:p>
             <a:fld id="{E68DDAF5-1EDA-4D1F-ADBC-948243D708D4}" type="datetimeFigureOut">
               <a:rPr lang="en-US" smtClean="0"/>
-              <a:t>3/20/17</a:t>
+              <a:t>4/10/17</a:t>
             </a:fld>
             <a:endParaRPr lang="en-US"/>
           </a:p>
@@ -2361,7 +2361,7 @@
           <a:p>
             <a:fld id="{E68DDAF5-1EDA-4D1F-ADBC-948243D708D4}" type="datetimeFigureOut">
               <a:rPr lang="en-US" smtClean="0"/>
-              <a:t>3/20/17</a:t>
+              <a:t>4/10/17</a:t>
             </a:fld>
             <a:endParaRPr lang="en-US"/>
           </a:p>
@@ -2614,7 +2614,7 @@
           <a:p>
             <a:fld id="{E68DDAF5-1EDA-4D1F-ADBC-948243D708D4}" type="datetimeFigureOut">
               <a:rPr lang="en-US" smtClean="0"/>
-              <a:t>3/20/17</a:t>
+              <a:t>4/10/17</a:t>
             </a:fld>
             <a:endParaRPr lang="en-US"/>
           </a:p>
@@ -2827,7 +2827,7 @@
           <a:p>
             <a:fld id="{E68DDAF5-1EDA-4D1F-ADBC-948243D708D4}" type="datetimeFigureOut">
               <a:rPr lang="en-US" smtClean="0"/>
-              <a:t>3/20/17</a:t>
+              <a:t>4/10/17</a:t>
             </a:fld>
             <a:endParaRPr lang="en-US"/>
           </a:p>
@@ -30540,11 +30540,15 @@
           <a:p>
             <a:r>
               <a:rPr lang="en-US" b="1" u="sng" dirty="0"/>
-              <a:t>7</a:t>
+              <a:t>8</a:t>
+            </a:r>
+            <a:r>
+              <a:rPr lang="en-US" b="1" u="sng" smtClean="0"/>
+              <a:t>: </a:t>
             </a:r>
             <a:r>
               <a:rPr lang="en-US" b="1" u="sng" dirty="0" smtClean="0"/>
-              <a:t>: ADVERSE REACTION</a:t>
+              <a:t>ADVERSE REACTION</a:t>
             </a:r>
             <a:r>
               <a:rPr lang="en-US" b="1" dirty="0" smtClean="0"/>

</xml_diff>